<commit_message>
add schematic to powerpoint
</commit_message>
<xml_diff>
--- a/Project Details/IR Presentation 2.pptx
+++ b/Project Details/IR Presentation 2.pptx
@@ -123,7 +123,7 @@
   </p:defaultTextStyle>
   <p:extLst>
     <p:ext uri="{EFAFB233-063F-42B5-8137-9DF3F51BA10A}">
-      <p15:sldGuideLst xmlns:p15="http://schemas.microsoft.com/office/powerpoint/2012/main">
+      <p15:sldGuideLst xmlns:p15="http://schemas.microsoft.com/office/powerpoint/2012/main" xmlns="">
         <p15:guide id="1" orient="horz" pos="2160">
           <p15:clr>
             <a:srgbClr val="A4A3A4"/>
@@ -4423,7 +4423,7 @@
           <a:p>
             <a:fld id="{48A87A34-81AB-432B-8DAE-1953F412C126}" type="datetimeFigureOut">
               <a:rPr lang="en-US" dirty="0"/>
-              <a:t>12/2/2013</a:t>
+              <a:t>12/3/2013</a:t>
             </a:fld>
             <a:endParaRPr lang="en-US" dirty="0"/>
           </a:p>
@@ -4685,7 +4685,7 @@
           <a:p>
             <a:fld id="{48A87A34-81AB-432B-8DAE-1953F412C126}" type="datetimeFigureOut">
               <a:rPr lang="en-US" dirty="0"/>
-              <a:t>12/2/2013</a:t>
+              <a:t>12/3/2013</a:t>
             </a:fld>
             <a:endParaRPr lang="en-US" dirty="0"/>
           </a:p>
@@ -4876,7 +4876,7 @@
           <a:p>
             <a:fld id="{48A87A34-81AB-432B-8DAE-1953F412C126}" type="datetimeFigureOut">
               <a:rPr lang="en-US" dirty="0"/>
-              <a:t>12/2/2013</a:t>
+              <a:t>12/3/2013</a:t>
             </a:fld>
             <a:endParaRPr lang="en-US" dirty="0"/>
           </a:p>
@@ -5134,7 +5134,7 @@
           <a:p>
             <a:fld id="{48A87A34-81AB-432B-8DAE-1953F412C126}" type="datetimeFigureOut">
               <a:rPr lang="en-US" dirty="0"/>
-              <a:t>12/2/2013</a:t>
+              <a:t>12/3/2013</a:t>
             </a:fld>
             <a:endParaRPr lang="en-US" dirty="0"/>
           </a:p>
@@ -5563,7 +5563,7 @@
           <a:p>
             <a:fld id="{48A87A34-81AB-432B-8DAE-1953F412C126}" type="datetimeFigureOut">
               <a:rPr lang="en-US" dirty="0"/>
-              <a:t>12/2/2013</a:t>
+              <a:t>12/3/2013</a:t>
             </a:fld>
             <a:endParaRPr lang="en-US" dirty="0"/>
           </a:p>
@@ -6104,7 +6104,7 @@
           <a:p>
             <a:fld id="{48A87A34-81AB-432B-8DAE-1953F412C126}" type="datetimeFigureOut">
               <a:rPr lang="en-US" dirty="0"/>
-              <a:t>12/2/2013</a:t>
+              <a:t>12/3/2013</a:t>
             </a:fld>
             <a:endParaRPr lang="en-US" dirty="0"/>
           </a:p>
@@ -6819,7 +6819,7 @@
           <a:p>
             <a:fld id="{48A87A34-81AB-432B-8DAE-1953F412C126}" type="datetimeFigureOut">
               <a:rPr lang="en-US" dirty="0"/>
-              <a:t>12/2/2013</a:t>
+              <a:t>12/3/2013</a:t>
             </a:fld>
             <a:endParaRPr lang="en-US" dirty="0"/>
           </a:p>
@@ -6984,7 +6984,7 @@
           <a:p>
             <a:fld id="{48A87A34-81AB-432B-8DAE-1953F412C126}" type="datetimeFigureOut">
               <a:rPr lang="en-US" dirty="0"/>
-              <a:t>12/2/2013</a:t>
+              <a:t>12/3/2013</a:t>
             </a:fld>
             <a:endParaRPr lang="en-US" dirty="0"/>
           </a:p>
@@ -7159,7 +7159,7 @@
           <a:p>
             <a:fld id="{48A87A34-81AB-432B-8DAE-1953F412C126}" type="datetimeFigureOut">
               <a:rPr lang="en-US" dirty="0"/>
-              <a:t>12/2/2013</a:t>
+              <a:t>12/3/2013</a:t>
             </a:fld>
             <a:endParaRPr lang="en-US" dirty="0"/>
           </a:p>
@@ -7324,7 +7324,7 @@
           <a:p>
             <a:fld id="{48A87A34-81AB-432B-8DAE-1953F412C126}" type="datetimeFigureOut">
               <a:rPr lang="en-US" dirty="0"/>
-              <a:t>12/2/2013</a:t>
+              <a:t>12/3/2013</a:t>
             </a:fld>
             <a:endParaRPr lang="en-US" dirty="0"/>
           </a:p>
@@ -7569,7 +7569,7 @@
           <a:p>
             <a:fld id="{48A87A34-81AB-432B-8DAE-1953F412C126}" type="datetimeFigureOut">
               <a:rPr lang="en-US" dirty="0"/>
-              <a:t>12/2/2013</a:t>
+              <a:t>12/3/2013</a:t>
             </a:fld>
             <a:endParaRPr lang="en-US" dirty="0"/>
           </a:p>
@@ -7796,7 +7796,7 @@
           <a:p>
             <a:fld id="{48A87A34-81AB-432B-8DAE-1953F412C126}" type="datetimeFigureOut">
               <a:rPr lang="en-US" dirty="0"/>
-              <a:t>12/2/2013</a:t>
+              <a:t>12/3/2013</a:t>
             </a:fld>
             <a:endParaRPr lang="en-US" dirty="0"/>
           </a:p>
@@ -8172,7 +8172,7 @@
           <a:p>
             <a:fld id="{48A87A34-81AB-432B-8DAE-1953F412C126}" type="datetimeFigureOut">
               <a:rPr lang="en-US" dirty="0"/>
-              <a:t>12/2/2013</a:t>
+              <a:t>12/3/2013</a:t>
             </a:fld>
             <a:endParaRPr lang="en-US" dirty="0"/>
           </a:p>
@@ -8285,7 +8285,7 @@
           <a:p>
             <a:fld id="{48A87A34-81AB-432B-8DAE-1953F412C126}" type="datetimeFigureOut">
               <a:rPr lang="en-US" dirty="0"/>
-              <a:t>12/2/2013</a:t>
+              <a:t>12/3/2013</a:t>
             </a:fld>
             <a:endParaRPr lang="en-US" dirty="0"/>
           </a:p>
@@ -8375,7 +8375,7 @@
           <a:p>
             <a:fld id="{48A87A34-81AB-432B-8DAE-1953F412C126}" type="datetimeFigureOut">
               <a:rPr lang="en-US" dirty="0"/>
-              <a:t>12/2/2013</a:t>
+              <a:t>12/3/2013</a:t>
             </a:fld>
             <a:endParaRPr lang="en-US" dirty="0"/>
           </a:p>
@@ -8619,7 +8619,7 @@
           <a:p>
             <a:fld id="{48A87A34-81AB-432B-8DAE-1953F412C126}" type="datetimeFigureOut">
               <a:rPr lang="en-US" dirty="0"/>
-              <a:t>12/2/2013</a:t>
+              <a:t>12/3/2013</a:t>
             </a:fld>
             <a:endParaRPr lang="en-US" dirty="0"/>
           </a:p>
@@ -8894,7 +8894,7 @@
           <a:p>
             <a:fld id="{48A87A34-81AB-432B-8DAE-1953F412C126}" type="datetimeFigureOut">
               <a:rPr lang="en-US" dirty="0"/>
-              <a:t>12/2/2013</a:t>
+              <a:t>12/3/2013</a:t>
             </a:fld>
             <a:endParaRPr lang="en-US" dirty="0"/>
           </a:p>
@@ -11974,7 +11974,7 @@
             <a:fld id="{48A87A34-81AB-432B-8DAE-1953F412C126}" type="datetimeFigureOut">
               <a:rPr lang="en-US" dirty="0"/>
               <a:pPr/>
-              <a:t>12/2/2013</a:t>
+              <a:t>12/3/2013</a:t>
             </a:fld>
             <a:endParaRPr lang="en-US" dirty="0"/>
           </a:p>
@@ -12517,11 +12517,6 @@
               </a:rPr>
               <a:t> </a:t>
             </a:r>
-            <a:endParaRPr lang="en-US" sz="3900" dirty="0" smtClean="0">
-              <a:solidFill>
-                <a:schemeClr val="bg2"/>
-              </a:solidFill>
-            </a:endParaRPr>
           </a:p>
           <a:p>
             <a:r>
@@ -13325,7 +13320,7 @@
       </p:sp>
       <p:pic>
         <p:nvPicPr>
-          <p:cNvPr id="20483" name="Picture 3" descr="\\khensu\Home05\mcope\Desktop\Schem.png"/>
+          <p:cNvPr id="20484" name="Picture 4" descr="\\khensu\Home05\mcope\Desktop\Board.png"/>
           <p:cNvPicPr>
             <a:picLocks noChangeAspect="1" noChangeArrowheads="1"/>
           </p:cNvPicPr>
@@ -13333,64 +13328,6 @@
         </p:nvPicPr>
         <p:blipFill>
           <a:blip r:embed="rId2">
-            <a:extLst>
-              <a:ext uri="{28A0092B-C50C-407E-A947-70E740481C1C}">
-                <a14:useLocalDpi xmlns:a14="http://schemas.microsoft.com/office/drawing/2010/main" val="0"/>
-              </a:ext>
-            </a:extLst>
-          </a:blip>
-          <a:srcRect/>
-          <a:stretch>
-            <a:fillRect/>
-          </a:stretch>
-        </p:blipFill>
-        <p:spPr bwMode="auto">
-          <a:xfrm>
-            <a:off x="908008" y="1619579"/>
-            <a:ext cx="7359692" cy="4769264"/>
-          </a:xfrm>
-          <a:prstGeom prst="roundRect">
-            <a:avLst>
-              <a:gd name="adj" fmla="val 372"/>
-            </a:avLst>
-          </a:prstGeom>
-          <a:solidFill>
-            <a:srgbClr val="FFFFFF"/>
-          </a:solidFill>
-          <a:ln w="76200" cap="sq">
-            <a:solidFill>
-              <a:srgbClr val="292929"/>
-            </a:solidFill>
-            <a:miter lim="800000"/>
-          </a:ln>
-          <a:effectLst>
-            <a:reflection blurRad="12700" stA="28000" endPos="28000" dist="5000" dir="5400000" sy="-100000" algn="bl" rotWithShape="0"/>
-          </a:effectLst>
-          <a:scene3d>
-            <a:camera prst="orthographicFront"/>
-            <a:lightRig rig="threePt" dir="t">
-              <a:rot lat="0" lon="0" rev="2700000"/>
-            </a:lightRig>
-          </a:scene3d>
-          <a:sp3d>
-            <a:bevelT h="38100"/>
-            <a:contourClr>
-              <a:srgbClr val="C0C0C0"/>
-            </a:contourClr>
-          </a:sp3d>
-          <a:extLst/>
-        </p:spPr>
-      </p:pic>
-      <p:pic>
-        <p:nvPicPr>
-          <p:cNvPr id="20484" name="Picture 4" descr="\\khensu\Home05\mcope\Desktop\Board.png"/>
-          <p:cNvPicPr>
-            <a:picLocks noChangeAspect="1" noChangeArrowheads="1"/>
-          </p:cNvPicPr>
-          <p:nvPr/>
-        </p:nvPicPr>
-        <p:blipFill>
-          <a:blip r:embed="rId3">
             <a:extLst>
               <a:ext uri="{28A0092B-C50C-407E-A947-70E740481C1C}">
                 <a14:useLocalDpi xmlns:a14="http://schemas.microsoft.com/office/drawing/2010/main" val="0"/>
@@ -13439,6 +13376,114 @@
           <a:extLst/>
         </p:spPr>
       </p:pic>
+      <p:pic>
+        <p:nvPicPr>
+          <p:cNvPr id="15363" name="Picture 3"/>
+          <p:cNvPicPr>
+            <a:picLocks noChangeAspect="1" noChangeArrowheads="1"/>
+          </p:cNvPicPr>
+          <p:nvPr/>
+        </p:nvPicPr>
+        <p:blipFill>
+          <a:blip r:embed="rId3">
+            <a:extLst>
+              <a:ext uri="{28A0092B-C50C-407E-A947-70E740481C1C}">
+                <a14:useLocalDpi xmlns:a14="http://schemas.microsoft.com/office/drawing/2010/main" val="0"/>
+              </a:ext>
+            </a:extLst>
+          </a:blip>
+          <a:srcRect/>
+          <a:stretch>
+            <a:fillRect/>
+          </a:stretch>
+        </p:blipFill>
+        <p:spPr bwMode="auto">
+          <a:xfrm>
+            <a:off x="295216" y="1795762"/>
+            <a:ext cx="6158074" cy="4621970"/>
+          </a:xfrm>
+          <a:prstGeom prst="rect">
+            <a:avLst/>
+          </a:prstGeom>
+          <a:noFill/>
+          <a:ln>
+            <a:noFill/>
+          </a:ln>
+          <a:extLst>
+            <a:ext uri="{909E8E84-426E-40DD-AFC4-6F175D3DCCD1}">
+              <a14:hiddenFill xmlns:a14="http://schemas.microsoft.com/office/drawing/2010/main">
+                <a:solidFill>
+                  <a:schemeClr val="accent1"/>
+                </a:solidFill>
+              </a14:hiddenFill>
+            </a:ext>
+            <a:ext uri="{91240B29-F687-4F45-9708-019B960494DF}">
+              <a14:hiddenLine xmlns:a14="http://schemas.microsoft.com/office/drawing/2010/main" w="9525">
+                <a:solidFill>
+                  <a:schemeClr val="tx1"/>
+                </a:solidFill>
+                <a:miter lim="800000"/>
+                <a:headEnd/>
+                <a:tailEnd/>
+              </a14:hiddenLine>
+            </a:ext>
+          </a:extLst>
+        </p:spPr>
+      </p:pic>
+      <p:pic>
+        <p:nvPicPr>
+          <p:cNvPr id="15362" name="Picture 2"/>
+          <p:cNvPicPr>
+            <a:picLocks noChangeAspect="1" noChangeArrowheads="1"/>
+          </p:cNvPicPr>
+          <p:nvPr/>
+        </p:nvPicPr>
+        <p:blipFill>
+          <a:blip r:embed="rId4">
+            <a:extLst>
+              <a:ext uri="{28A0092B-C50C-407E-A947-70E740481C1C}">
+                <a14:useLocalDpi xmlns:a14="http://schemas.microsoft.com/office/drawing/2010/main" val="0"/>
+              </a:ext>
+            </a:extLst>
+          </a:blip>
+          <a:srcRect/>
+          <a:stretch>
+            <a:fillRect/>
+          </a:stretch>
+        </p:blipFill>
+        <p:spPr bwMode="auto">
+          <a:xfrm>
+            <a:off x="5464903" y="4906390"/>
+            <a:ext cx="6388729" cy="1755198"/>
+          </a:xfrm>
+          <a:prstGeom prst="rect">
+            <a:avLst/>
+          </a:prstGeom>
+          <a:noFill/>
+          <a:ln>
+            <a:noFill/>
+          </a:ln>
+          <a:extLst>
+            <a:ext uri="{909E8E84-426E-40DD-AFC4-6F175D3DCCD1}">
+              <a14:hiddenFill xmlns:a14="http://schemas.microsoft.com/office/drawing/2010/main">
+                <a:solidFill>
+                  <a:schemeClr val="accent1"/>
+                </a:solidFill>
+              </a14:hiddenFill>
+            </a:ext>
+            <a:ext uri="{91240B29-F687-4F45-9708-019B960494DF}">
+              <a14:hiddenLine xmlns:a14="http://schemas.microsoft.com/office/drawing/2010/main" w="9525">
+                <a:solidFill>
+                  <a:schemeClr val="tx1"/>
+                </a:solidFill>
+                <a:miter lim="800000"/>
+                <a:headEnd/>
+                <a:tailEnd/>
+              </a14:hiddenLine>
+            </a:ext>
+          </a:extLst>
+        </p:spPr>
+      </p:pic>
     </p:spTree>
     <p:extLst>
       <p:ext uri="{BB962C8B-B14F-4D97-AF65-F5344CB8AC3E}">
@@ -15124,43 +15169,7 @@
                   </a:outerShdw>
                 </a:effectLst>
               </a:rPr>
-              <a:t>Originally got idea from sprinklers </a:t>
-            </a:r>
-            <a:r>
-              <a:rPr lang="en-US" sz="2000" dirty="0" smtClean="0">
-                <a:solidFill>
-                  <a:schemeClr val="tx2">
-                    <a:lumMod val="40000"/>
-                    <a:lumOff val="60000"/>
-                  </a:schemeClr>
-                </a:solidFill>
-                <a:effectLst>
-                  <a:outerShdw blurRad="152400" dist="38100" dir="2700000" algn="tl">
-                    <a:srgbClr val="000000">
-                      <a:alpha val="36000"/>
-                    </a:srgbClr>
-                  </a:outerShdw>
-                </a:effectLst>
-              </a:rPr>
-              <a:t>designed </a:t>
-            </a:r>
-            <a:r>
-              <a:rPr lang="en-US" sz="2000" dirty="0" smtClean="0">
-                <a:solidFill>
-                  <a:schemeClr val="tx2">
-                    <a:lumMod val="40000"/>
-                    <a:lumOff val="60000"/>
-                  </a:schemeClr>
-                </a:solidFill>
-                <a:effectLst>
-                  <a:outerShdw blurRad="152400" dist="38100" dir="2700000" algn="tl">
-                    <a:srgbClr val="000000">
-                      <a:alpha val="36000"/>
-                    </a:srgbClr>
-                  </a:outerShdw>
-                </a:effectLst>
-              </a:rPr>
-              <a:t>to keep deer out of yards.</a:t>
+              <a:t>Originally got idea from sprinklers designed to keep deer out of yards.</a:t>
             </a:r>
           </a:p>
           <a:p>
@@ -16721,12 +16730,12 @@
           <a:graphicData uri="http://schemas.openxmlformats.org/presentationml/2006/ole">
             <mc:AlternateContent xmlns:mc="http://schemas.openxmlformats.org/markup-compatibility/2006">
               <mc:Choice xmlns:v="urn:schemas-microsoft-com:vml" Requires="v">
-                <p:oleObj spid="_x0000_s13340" r:id="rId3" imgW="5067465" imgH="5813949" progId="Visio.Drawing.15">
+                <p:oleObj spid="_x0000_s13342" r:id="rId4" imgW="5067465" imgH="5813949" progId="Visio.Drawing.15">
                   <p:embed/>
                 </p:oleObj>
               </mc:Choice>
               <mc:Fallback>
-                <p:oleObj r:id="rId3" imgW="5067465" imgH="5813949" progId="Visio.Drawing.15">
+                <p:oleObj r:id="rId4" imgW="5067465" imgH="5813949" progId="Visio.Drawing.15">
                   <p:embed/>
                   <p:pic>
                     <p:nvPicPr>
@@ -16737,7 +16746,7 @@
                       <p:nvPr/>
                     </p:nvPicPr>
                     <p:blipFill>
-                      <a:blip r:embed="rId4">
+                      <a:blip r:embed="rId5">
                         <a:extLst>
                           <a:ext uri="{28A0092B-C50C-407E-A947-70E740481C1C}">
                             <a14:useLocalDpi xmlns:a14="http://schemas.microsoft.com/office/drawing/2010/main" val="0"/>
@@ -16851,12 +16860,12 @@
           <a:graphicData uri="http://schemas.openxmlformats.org/presentationml/2006/ole">
             <mc:AlternateContent xmlns:mc="http://schemas.openxmlformats.org/markup-compatibility/2006">
               <mc:Choice xmlns:v="urn:schemas-microsoft-com:vml" Requires="v">
-                <p:oleObj spid="_x0000_s13341" r:id="rId5" imgW="6103656" imgH="4015614" progId="Visio.Drawing.15">
+                <p:oleObj spid="_x0000_s13343" r:id="rId7" imgW="6103656" imgH="4015614" progId="Visio.Drawing.15">
                   <p:embed/>
                 </p:oleObj>
               </mc:Choice>
               <mc:Fallback>
-                <p:oleObj r:id="rId5" imgW="6103656" imgH="4015614" progId="Visio.Drawing.15">
+                <p:oleObj r:id="rId7" imgW="6103656" imgH="4015614" progId="Visio.Drawing.15">
                   <p:embed/>
                   <p:pic>
                     <p:nvPicPr>
@@ -16867,7 +16876,7 @@
                       <p:nvPr/>
                     </p:nvPicPr>
                     <p:blipFill>
-                      <a:blip r:embed="rId6">
+                      <a:blip r:embed="rId8">
                         <a:extLst>
                           <a:ext uri="{28A0092B-C50C-407E-A947-70E740481C1C}">
                             <a14:useLocalDpi xmlns:a14="http://schemas.microsoft.com/office/drawing/2010/main" val="0"/>
@@ -16955,12 +16964,12 @@
           <a:graphicData uri="http://schemas.openxmlformats.org/presentationml/2006/ole">
             <mc:AlternateContent xmlns:mc="http://schemas.openxmlformats.org/markup-compatibility/2006">
               <mc:Choice xmlns:v="urn:schemas-microsoft-com:vml" Requires="v">
-                <p:oleObj spid="_x0000_s14354" name="Visio" r:id="rId3" imgW="7307545" imgH="6804557" progId="Visio.Drawing.15">
+                <p:oleObj spid="_x0000_s14355" name="Visio" r:id="rId4" imgW="7307545" imgH="6804557" progId="Visio.Drawing.15">
                   <p:embed/>
                 </p:oleObj>
               </mc:Choice>
               <mc:Fallback>
-                <p:oleObj name="Visio" r:id="rId3" imgW="7307545" imgH="6804557" progId="Visio.Drawing.15">
+                <p:oleObj name="Visio" r:id="rId4" imgW="7307545" imgH="6804557" progId="Visio.Drawing.15">
                   <p:embed/>
                   <p:pic>
                     <p:nvPicPr>
@@ -16971,7 +16980,7 @@
                       <p:nvPr/>
                     </p:nvPicPr>
                     <p:blipFill>
-                      <a:blip r:embed="rId4">
+                      <a:blip r:embed="rId5">
                         <a:extLst>
                           <a:ext uri="{28A0092B-C50C-407E-A947-70E740481C1C}">
                             <a14:useLocalDpi xmlns:a14="http://schemas.microsoft.com/office/drawing/2010/main" val="0"/>
@@ -17106,18 +17115,7 @@
                   </a:schemeClr>
                 </a:solidFill>
               </a:rPr>
-              <a:t>Selection </a:t>
-            </a:r>
-            <a:r>
-              <a:rPr lang="en-US" dirty="0" smtClean="0">
-                <a:solidFill>
-                  <a:schemeClr val="tx2">
-                    <a:lumMod val="40000"/>
-                    <a:lumOff val="60000"/>
-                  </a:schemeClr>
-                </a:solidFill>
-              </a:rPr>
-              <a:t>of Actuator</a:t>
+              <a:t>Selection of Actuator</a:t>
             </a:r>
           </a:p>
           <a:p>
@@ -18196,7 +18194,7 @@
   <a:extraClrSchemeLst/>
   <a:extLst>
     <a:ext uri="{05A4C25C-085E-4340-85A3-A5531E510DB2}">
-      <thm15:themeFamily xmlns:thm15="http://schemas.microsoft.com/office/thememl/2012/main" name="Circuit" id="{0AC2F7E7-15F5-431C-B2A2-456FE929F56C}" vid="{97ECCC31-8429-4523-BE8D-8F09B7A4D46D}"/>
+      <thm15:themeFamily xmlns:thm15="http://schemas.microsoft.com/office/thememl/2012/main" xmlns="" name="Circuit" id="{0AC2F7E7-15F5-431C-B2A2-456FE929F56C}" vid="{97ECCC31-8429-4523-BE8D-8F09B7A4D46D}"/>
     </a:ext>
   </a:extLst>
 </a:theme>

</xml_diff>

<commit_message>
add border to schematic on powerpoint
</commit_message>
<xml_diff>
--- a/Project Details/IR Presentation 2.pptx
+++ b/Project Details/IR Presentation 2.pptx
@@ -13402,13 +13402,35 @@
             <a:off x="295216" y="1795762"/>
             <a:ext cx="6158074" cy="4621970"/>
           </a:xfrm>
-          <a:prstGeom prst="rect">
-            <a:avLst/>
+          <a:prstGeom prst="roundRect">
+            <a:avLst>
+              <a:gd name="adj" fmla="val 4167"/>
+            </a:avLst>
           </a:prstGeom>
-          <a:noFill/>
-          <a:ln>
-            <a:noFill/>
+          <a:solidFill>
+            <a:srgbClr val="FFFFFF"/>
+          </a:solidFill>
+          <a:ln w="76200" cap="sq">
+            <a:solidFill>
+              <a:srgbClr val="292929"/>
+            </a:solidFill>
+            <a:miter lim="800000"/>
           </a:ln>
+          <a:effectLst>
+            <a:reflection blurRad="12700" stA="28000" endPos="28000" dist="5000" dir="5400000" sy="-100000" algn="bl" rotWithShape="0"/>
+          </a:effectLst>
+          <a:scene3d>
+            <a:camera prst="orthographicFront"/>
+            <a:lightRig rig="threePt" dir="t">
+              <a:rot lat="0" lon="0" rev="2700000"/>
+            </a:lightRig>
+          </a:scene3d>
+          <a:sp3d>
+            <a:bevelT h="38100"/>
+            <a:contourClr>
+              <a:srgbClr val="C0C0C0"/>
+            </a:contourClr>
+          </a:sp3d>
           <a:extLst>
             <a:ext uri="{909E8E84-426E-40DD-AFC4-6F175D3DCCD1}">
               <a14:hiddenFill xmlns:a14="http://schemas.microsoft.com/office/drawing/2010/main">
@@ -13456,13 +13478,35 @@
             <a:off x="5464903" y="4906390"/>
             <a:ext cx="6388729" cy="1755198"/>
           </a:xfrm>
-          <a:prstGeom prst="rect">
-            <a:avLst/>
+          <a:prstGeom prst="roundRect">
+            <a:avLst>
+              <a:gd name="adj" fmla="val 4167"/>
+            </a:avLst>
           </a:prstGeom>
-          <a:noFill/>
-          <a:ln>
-            <a:noFill/>
+          <a:solidFill>
+            <a:srgbClr val="FFFFFF"/>
+          </a:solidFill>
+          <a:ln w="76200" cap="sq">
+            <a:solidFill>
+              <a:srgbClr val="292929"/>
+            </a:solidFill>
+            <a:miter lim="800000"/>
           </a:ln>
+          <a:effectLst>
+            <a:reflection blurRad="12700" stA="28000" endPos="28000" dist="5000" dir="5400000" sy="-100000" algn="bl" rotWithShape="0"/>
+          </a:effectLst>
+          <a:scene3d>
+            <a:camera prst="orthographicFront"/>
+            <a:lightRig rig="threePt" dir="t">
+              <a:rot lat="0" lon="0" rev="2700000"/>
+            </a:lightRig>
+          </a:scene3d>
+          <a:sp3d>
+            <a:bevelT h="38100"/>
+            <a:contourClr>
+              <a:srgbClr val="C0C0C0"/>
+            </a:contourClr>
+          </a:sp3d>
           <a:extLst>
             <a:ext uri="{909E8E84-426E-40DD-AFC4-6F175D3DCCD1}">
               <a14:hiddenFill xmlns:a14="http://schemas.microsoft.com/office/drawing/2010/main">
@@ -16730,12 +16774,12 @@
           <a:graphicData uri="http://schemas.openxmlformats.org/presentationml/2006/ole">
             <mc:AlternateContent xmlns:mc="http://schemas.openxmlformats.org/markup-compatibility/2006">
               <mc:Choice xmlns:v="urn:schemas-microsoft-com:vml" Requires="v">
-                <p:oleObj spid="_x0000_s13342" r:id="rId4" imgW="5067465" imgH="5813949" progId="Visio.Drawing.15">
+                <p:oleObj spid="_x0000_s13344" r:id="rId3" imgW="5067465" imgH="5813949" progId="Visio.Drawing.15">
                   <p:embed/>
                 </p:oleObj>
               </mc:Choice>
               <mc:Fallback>
-                <p:oleObj r:id="rId4" imgW="5067465" imgH="5813949" progId="Visio.Drawing.15">
+                <p:oleObj r:id="rId3" imgW="5067465" imgH="5813949" progId="Visio.Drawing.15">
                   <p:embed/>
                   <p:pic>
                     <p:nvPicPr>
@@ -16746,7 +16790,7 @@
                       <p:nvPr/>
                     </p:nvPicPr>
                     <p:blipFill>
-                      <a:blip r:embed="rId5">
+                      <a:blip r:embed="rId4">
                         <a:extLst>
                           <a:ext uri="{28A0092B-C50C-407E-A947-70E740481C1C}">
                             <a14:useLocalDpi xmlns:a14="http://schemas.microsoft.com/office/drawing/2010/main" val="0"/>
@@ -16860,12 +16904,12 @@
           <a:graphicData uri="http://schemas.openxmlformats.org/presentationml/2006/ole">
             <mc:AlternateContent xmlns:mc="http://schemas.openxmlformats.org/markup-compatibility/2006">
               <mc:Choice xmlns:v="urn:schemas-microsoft-com:vml" Requires="v">
-                <p:oleObj spid="_x0000_s13343" r:id="rId7" imgW="6103656" imgH="4015614" progId="Visio.Drawing.15">
+                <p:oleObj spid="_x0000_s13345" r:id="rId5" imgW="6103656" imgH="4015614" progId="Visio.Drawing.15">
                   <p:embed/>
                 </p:oleObj>
               </mc:Choice>
               <mc:Fallback>
-                <p:oleObj r:id="rId7" imgW="6103656" imgH="4015614" progId="Visio.Drawing.15">
+                <p:oleObj r:id="rId5" imgW="6103656" imgH="4015614" progId="Visio.Drawing.15">
                   <p:embed/>
                   <p:pic>
                     <p:nvPicPr>
@@ -16876,7 +16920,7 @@
                       <p:nvPr/>
                     </p:nvPicPr>
                     <p:blipFill>
-                      <a:blip r:embed="rId8">
+                      <a:blip r:embed="rId6">
                         <a:extLst>
                           <a:ext uri="{28A0092B-C50C-407E-A947-70E740481C1C}">
                             <a14:useLocalDpi xmlns:a14="http://schemas.microsoft.com/office/drawing/2010/main" val="0"/>
@@ -16964,12 +17008,12 @@
           <a:graphicData uri="http://schemas.openxmlformats.org/presentationml/2006/ole">
             <mc:AlternateContent xmlns:mc="http://schemas.openxmlformats.org/markup-compatibility/2006">
               <mc:Choice xmlns:v="urn:schemas-microsoft-com:vml" Requires="v">
-                <p:oleObj spid="_x0000_s14355" name="Visio" r:id="rId4" imgW="7307545" imgH="6804557" progId="Visio.Drawing.15">
+                <p:oleObj spid="_x0000_s14356" name="Visio" r:id="rId3" imgW="7307545" imgH="6804557" progId="Visio.Drawing.15">
                   <p:embed/>
                 </p:oleObj>
               </mc:Choice>
               <mc:Fallback>
-                <p:oleObj name="Visio" r:id="rId4" imgW="7307545" imgH="6804557" progId="Visio.Drawing.15">
+                <p:oleObj name="Visio" r:id="rId3" imgW="7307545" imgH="6804557" progId="Visio.Drawing.15">
                   <p:embed/>
                   <p:pic>
                     <p:nvPicPr>
@@ -16980,7 +17024,7 @@
                       <p:nvPr/>
                     </p:nvPicPr>
                     <p:blipFill>
-                      <a:blip r:embed="rId5">
+                      <a:blip r:embed="rId4">
                         <a:extLst>
                           <a:ext uri="{28A0092B-C50C-407E-A947-70E740481C1C}">
                             <a14:useLocalDpi xmlns:a14="http://schemas.microsoft.com/office/drawing/2010/main" val="0"/>

</xml_diff>